<commit_message>
Initial draft of services page
</commit_message>
<xml_diff>
--- a/images/Images.pptx
+++ b/images/Images.pptx
@@ -6,6 +6,7 @@
   </p:sldMasterIdLst>
   <p:sldIdLst>
     <p:sldId id="270" r:id="rId2"/>
+    <p:sldId id="271" r:id="rId3"/>
   </p:sldIdLst>
   <p:sldSz cx="7772400" cy="10058400"/>
   <p:notesSz cx="6858000" cy="9144000"/>
@@ -254,7 +255,7 @@
           <a:p>
             <a:fld id="{F45DECB7-1A06-4872-8489-36E7D807266D}" type="datetimeFigureOut">
               <a:rPr lang="en-US" smtClean="0"/>
-              <a:t>1/26/2024</a:t>
+              <a:t>2/2/2024</a:t>
             </a:fld>
             <a:endParaRPr lang="en-US"/>
           </a:p>
@@ -424,7 +425,7 @@
           <a:p>
             <a:fld id="{F45DECB7-1A06-4872-8489-36E7D807266D}" type="datetimeFigureOut">
               <a:rPr lang="en-US" smtClean="0"/>
-              <a:t>1/26/2024</a:t>
+              <a:t>2/2/2024</a:t>
             </a:fld>
             <a:endParaRPr lang="en-US"/>
           </a:p>
@@ -604,7 +605,7 @@
           <a:p>
             <a:fld id="{F45DECB7-1A06-4872-8489-36E7D807266D}" type="datetimeFigureOut">
               <a:rPr lang="en-US" smtClean="0"/>
-              <a:t>1/26/2024</a:t>
+              <a:t>2/2/2024</a:t>
             </a:fld>
             <a:endParaRPr lang="en-US"/>
           </a:p>
@@ -774,7 +775,7 @@
           <a:p>
             <a:fld id="{F45DECB7-1A06-4872-8489-36E7D807266D}" type="datetimeFigureOut">
               <a:rPr lang="en-US" smtClean="0"/>
-              <a:t>1/26/2024</a:t>
+              <a:t>2/2/2024</a:t>
             </a:fld>
             <a:endParaRPr lang="en-US"/>
           </a:p>
@@ -1020,7 +1021,7 @@
           <a:p>
             <a:fld id="{F45DECB7-1A06-4872-8489-36E7D807266D}" type="datetimeFigureOut">
               <a:rPr lang="en-US" smtClean="0"/>
-              <a:t>1/26/2024</a:t>
+              <a:t>2/2/2024</a:t>
             </a:fld>
             <a:endParaRPr lang="en-US"/>
           </a:p>
@@ -1252,7 +1253,7 @@
           <a:p>
             <a:fld id="{F45DECB7-1A06-4872-8489-36E7D807266D}" type="datetimeFigureOut">
               <a:rPr lang="en-US" smtClean="0"/>
-              <a:t>1/26/2024</a:t>
+              <a:t>2/2/2024</a:t>
             </a:fld>
             <a:endParaRPr lang="en-US"/>
           </a:p>
@@ -1619,7 +1620,7 @@
           <a:p>
             <a:fld id="{F45DECB7-1A06-4872-8489-36E7D807266D}" type="datetimeFigureOut">
               <a:rPr lang="en-US" smtClean="0"/>
-              <a:t>1/26/2024</a:t>
+              <a:t>2/2/2024</a:t>
             </a:fld>
             <a:endParaRPr lang="en-US"/>
           </a:p>
@@ -1737,7 +1738,7 @@
           <a:p>
             <a:fld id="{F45DECB7-1A06-4872-8489-36E7D807266D}" type="datetimeFigureOut">
               <a:rPr lang="en-US" smtClean="0"/>
-              <a:t>1/26/2024</a:t>
+              <a:t>2/2/2024</a:t>
             </a:fld>
             <a:endParaRPr lang="en-US"/>
           </a:p>
@@ -1832,7 +1833,7 @@
           <a:p>
             <a:fld id="{F45DECB7-1A06-4872-8489-36E7D807266D}" type="datetimeFigureOut">
               <a:rPr lang="en-US" smtClean="0"/>
-              <a:t>1/26/2024</a:t>
+              <a:t>2/2/2024</a:t>
             </a:fld>
             <a:endParaRPr lang="en-US"/>
           </a:p>
@@ -2109,7 +2110,7 @@
           <a:p>
             <a:fld id="{F45DECB7-1A06-4872-8489-36E7D807266D}" type="datetimeFigureOut">
               <a:rPr lang="en-US" smtClean="0"/>
-              <a:t>1/26/2024</a:t>
+              <a:t>2/2/2024</a:t>
             </a:fld>
             <a:endParaRPr lang="en-US"/>
           </a:p>
@@ -2366,7 +2367,7 @@
           <a:p>
             <a:fld id="{F45DECB7-1A06-4872-8489-36E7D807266D}" type="datetimeFigureOut">
               <a:rPr lang="en-US" smtClean="0"/>
-              <a:t>1/26/2024</a:t>
+              <a:t>2/2/2024</a:t>
             </a:fld>
             <a:endParaRPr lang="en-US"/>
           </a:p>
@@ -2579,7 +2580,7 @@
           <a:p>
             <a:fld id="{F45DECB7-1A06-4872-8489-36E7D807266D}" type="datetimeFigureOut">
               <a:rPr lang="en-US" smtClean="0"/>
-              <a:t>1/26/2024</a:t>
+              <a:t>2/2/2024</a:t>
             </a:fld>
             <a:endParaRPr lang="en-US"/>
           </a:p>
@@ -3903,6 +3904,1679 @@
 </p:sld>
 </file>
 
+<file path=ppt/slides/slide2.xml><?xml version="1.0" encoding="utf-8"?>
+<p:sld xmlns:a="http://schemas.openxmlformats.org/drawingml/2006/main" xmlns:r="http://schemas.openxmlformats.org/officeDocument/2006/relationships" xmlns:p="http://schemas.openxmlformats.org/presentationml/2006/main">
+  <p:cSld>
+    <p:spTree>
+      <p:nvGrpSpPr>
+        <p:cNvPr id="1" name=""/>
+        <p:cNvGrpSpPr/>
+        <p:nvPr/>
+      </p:nvGrpSpPr>
+      <p:grpSpPr>
+        <a:xfrm>
+          <a:off x="0" y="0"/>
+          <a:ext cx="0" cy="0"/>
+          <a:chOff x="0" y="0"/>
+          <a:chExt cx="0" cy="0"/>
+        </a:xfrm>
+      </p:grpSpPr>
+      <p:grpSp>
+        <p:nvGrpSpPr>
+          <p:cNvPr id="2" name="Group 1">
+            <a:extLst>
+              <a:ext uri="{FF2B5EF4-FFF2-40B4-BE49-F238E27FC236}">
+                <a16:creationId xmlns:a16="http://schemas.microsoft.com/office/drawing/2014/main" id="{084EA16E-D683-2F39-63DA-9EDF713566E5}"/>
+              </a:ext>
+            </a:extLst>
+          </p:cNvPr>
+          <p:cNvGrpSpPr/>
+          <p:nvPr/>
+        </p:nvGrpSpPr>
+        <p:grpSpPr>
+          <a:xfrm>
+            <a:off x="965200" y="2798351"/>
+            <a:ext cx="5639389" cy="1291155"/>
+            <a:chOff x="0" y="2366551"/>
+            <a:chExt cx="5639389" cy="1291155"/>
+          </a:xfrm>
+        </p:grpSpPr>
+        <p:grpSp>
+          <p:nvGrpSpPr>
+            <p:cNvPr id="3" name="Group 2">
+              <a:extLst>
+                <a:ext uri="{FF2B5EF4-FFF2-40B4-BE49-F238E27FC236}">
+                  <a16:creationId xmlns:a16="http://schemas.microsoft.com/office/drawing/2014/main" id="{692C4211-A2B4-AD1F-5E56-BEB46C136528}"/>
+                </a:ext>
+              </a:extLst>
+            </p:cNvPr>
+            <p:cNvGrpSpPr/>
+            <p:nvPr/>
+          </p:nvGrpSpPr>
+          <p:grpSpPr>
+            <a:xfrm>
+              <a:off x="4162009" y="2372979"/>
+              <a:ext cx="1477380" cy="1284727"/>
+              <a:chOff x="4162009" y="2372979"/>
+              <a:chExt cx="1477380" cy="1284727"/>
+            </a:xfrm>
+          </p:grpSpPr>
+          <p:sp>
+            <p:nvSpPr>
+              <p:cNvPr id="17" name="Text Placeholder 26">
+                <a:extLst>
+                  <a:ext uri="{FF2B5EF4-FFF2-40B4-BE49-F238E27FC236}">
+                    <a16:creationId xmlns:a16="http://schemas.microsoft.com/office/drawing/2014/main" id="{44832E64-4687-E323-96B6-7936B7FD1EC8}"/>
+                  </a:ext>
+                </a:extLst>
+              </p:cNvPr>
+              <p:cNvSpPr txBox="1">
+                <a:spLocks/>
+              </p:cNvSpPr>
+              <p:nvPr/>
+            </p:nvSpPr>
+            <p:spPr>
+              <a:xfrm>
+                <a:off x="4162009" y="3297343"/>
+                <a:ext cx="1477380" cy="360363"/>
+              </a:xfrm>
+              <a:prstGeom prst="rect">
+                <a:avLst/>
+              </a:prstGeom>
+            </p:spPr>
+            <p:txBody>
+              <a:bodyPr vert="horz" lIns="0" tIns="0" rIns="0" bIns="0" rtlCol="0" anchor="ctr">
+                <a:noAutofit/>
+              </a:bodyPr>
+              <a:lstStyle>
+                <a:lvl1pPr marL="0" indent="0" algn="ctr" defTabSz="914400" rtl="0" eaLnBrk="1" latinLnBrk="0" hangingPunct="1">
+                  <a:lnSpc>
+                    <a:spcPct val="100000"/>
+                  </a:lnSpc>
+                  <a:spcBef>
+                    <a:spcPts val="1000"/>
+                  </a:spcBef>
+                  <a:spcAft>
+                    <a:spcPts val="500"/>
+                  </a:spcAft>
+                  <a:buClr>
+                    <a:srgbClr val="EBAF44"/>
+                  </a:buClr>
+                  <a:buFont typeface="Arial" panose="020B0604020202020204" pitchFamily="34" charset="0"/>
+                  <a:buNone/>
+                  <a:defRPr sz="1800" kern="1200">
+                    <a:solidFill>
+                      <a:schemeClr val="tx1">
+                        <a:lumMod val="75000"/>
+                        <a:lumOff val="25000"/>
+                      </a:schemeClr>
+                    </a:solidFill>
+                    <a:latin typeface="Montserrat" panose="00000500000000000000" pitchFamily="50" charset="0"/>
+                    <a:ea typeface="+mn-ea"/>
+                    <a:cs typeface="+mn-cs"/>
+                  </a:defRPr>
+                </a:lvl1pPr>
+                <a:lvl2pPr marL="542925" indent="-276225" algn="l" defTabSz="914400" rtl="0" eaLnBrk="1" latinLnBrk="0" hangingPunct="1">
+                  <a:lnSpc>
+                    <a:spcPct val="100000"/>
+                  </a:lnSpc>
+                  <a:spcBef>
+                    <a:spcPts val="500"/>
+                  </a:spcBef>
+                  <a:spcAft>
+                    <a:spcPts val="500"/>
+                  </a:spcAft>
+                  <a:buClr>
+                    <a:srgbClr val="EBAF44"/>
+                  </a:buClr>
+                  <a:buFont typeface="Arial" panose="020B0604020202020204" pitchFamily="34" charset="0"/>
+                  <a:buChar char="•"/>
+                  <a:defRPr sz="1800" kern="1200">
+                    <a:solidFill>
+                      <a:schemeClr val="tx2"/>
+                    </a:solidFill>
+                    <a:latin typeface="Montserrat" panose="00000500000000000000" pitchFamily="50" charset="0"/>
+                    <a:ea typeface="+mn-ea"/>
+                    <a:cs typeface="+mn-cs"/>
+                  </a:defRPr>
+                </a:lvl2pPr>
+                <a:lvl3pPr marL="809625" indent="-266700" algn="l" defTabSz="914400" rtl="0" eaLnBrk="1" latinLnBrk="0" hangingPunct="1">
+                  <a:lnSpc>
+                    <a:spcPct val="100000"/>
+                  </a:lnSpc>
+                  <a:spcBef>
+                    <a:spcPts val="500"/>
+                  </a:spcBef>
+                  <a:spcAft>
+                    <a:spcPts val="500"/>
+                  </a:spcAft>
+                  <a:buClr>
+                    <a:srgbClr val="EBAF44"/>
+                  </a:buClr>
+                  <a:buFont typeface="Arial" panose="020B0604020202020204" pitchFamily="34" charset="0"/>
+                  <a:buChar char="•"/>
+                  <a:defRPr sz="1800" kern="1200">
+                    <a:solidFill>
+                      <a:schemeClr val="tx2"/>
+                    </a:solidFill>
+                    <a:latin typeface="Montserrat" panose="00000500000000000000" pitchFamily="50" charset="0"/>
+                    <a:ea typeface="+mn-ea"/>
+                    <a:cs typeface="+mn-cs"/>
+                  </a:defRPr>
+                </a:lvl3pPr>
+                <a:lvl4pPr marL="1076325" indent="-266700" algn="l" defTabSz="914400" rtl="0" eaLnBrk="1" latinLnBrk="0" hangingPunct="1">
+                  <a:lnSpc>
+                    <a:spcPct val="100000"/>
+                  </a:lnSpc>
+                  <a:spcBef>
+                    <a:spcPts val="500"/>
+                  </a:spcBef>
+                  <a:spcAft>
+                    <a:spcPts val="500"/>
+                  </a:spcAft>
+                  <a:buClr>
+                    <a:srgbClr val="EBAF44"/>
+                  </a:buClr>
+                  <a:buFont typeface="Arial" panose="020B0604020202020204" pitchFamily="34" charset="0"/>
+                  <a:buChar char="•"/>
+                  <a:defRPr sz="1800" kern="1200">
+                    <a:solidFill>
+                      <a:schemeClr val="tx2"/>
+                    </a:solidFill>
+                    <a:latin typeface="Montserrat" panose="00000500000000000000" pitchFamily="50" charset="0"/>
+                    <a:ea typeface="+mn-ea"/>
+                    <a:cs typeface="+mn-cs"/>
+                  </a:defRPr>
+                </a:lvl4pPr>
+                <a:lvl5pPr marL="1343025" indent="-266700" algn="l" defTabSz="914400" rtl="0" eaLnBrk="1" latinLnBrk="0" hangingPunct="1">
+                  <a:lnSpc>
+                    <a:spcPct val="100000"/>
+                  </a:lnSpc>
+                  <a:spcBef>
+                    <a:spcPts val="500"/>
+                  </a:spcBef>
+                  <a:spcAft>
+                    <a:spcPts val="500"/>
+                  </a:spcAft>
+                  <a:buClr>
+                    <a:srgbClr val="EBAF44"/>
+                  </a:buClr>
+                  <a:buFont typeface="Arial" panose="020B0604020202020204" pitchFamily="34" charset="0"/>
+                  <a:buChar char="•"/>
+                  <a:defRPr sz="1800" kern="1200">
+                    <a:solidFill>
+                      <a:schemeClr val="tx2"/>
+                    </a:solidFill>
+                    <a:latin typeface="Montserrat" panose="00000500000000000000" pitchFamily="50" charset="0"/>
+                    <a:ea typeface="+mn-ea"/>
+                    <a:cs typeface="+mn-cs"/>
+                  </a:defRPr>
+                </a:lvl5pPr>
+                <a:lvl6pPr marL="2514600" indent="-228600" algn="l" defTabSz="914400" rtl="0" eaLnBrk="1" latinLnBrk="0" hangingPunct="1">
+                  <a:lnSpc>
+                    <a:spcPct val="90000"/>
+                  </a:lnSpc>
+                  <a:spcBef>
+                    <a:spcPts val="500"/>
+                  </a:spcBef>
+                  <a:buFont typeface="Arial" panose="020B0604020202020204" pitchFamily="34" charset="0"/>
+                  <a:buChar char="•"/>
+                  <a:defRPr sz="1800" kern="1200">
+                    <a:solidFill>
+                      <a:schemeClr val="tx1"/>
+                    </a:solidFill>
+                    <a:latin typeface="+mn-lt"/>
+                    <a:ea typeface="+mn-ea"/>
+                    <a:cs typeface="+mn-cs"/>
+                  </a:defRPr>
+                </a:lvl6pPr>
+                <a:lvl7pPr marL="2971800" indent="-228600" algn="l" defTabSz="914400" rtl="0" eaLnBrk="1" latinLnBrk="0" hangingPunct="1">
+                  <a:lnSpc>
+                    <a:spcPct val="90000"/>
+                  </a:lnSpc>
+                  <a:spcBef>
+                    <a:spcPts val="500"/>
+                  </a:spcBef>
+                  <a:buFont typeface="Arial" panose="020B0604020202020204" pitchFamily="34" charset="0"/>
+                  <a:buChar char="•"/>
+                  <a:defRPr sz="1800" kern="1200">
+                    <a:solidFill>
+                      <a:schemeClr val="tx1"/>
+                    </a:solidFill>
+                    <a:latin typeface="+mn-lt"/>
+                    <a:ea typeface="+mn-ea"/>
+                    <a:cs typeface="+mn-cs"/>
+                  </a:defRPr>
+                </a:lvl7pPr>
+                <a:lvl8pPr marL="3429000" indent="-228600" algn="l" defTabSz="914400" rtl="0" eaLnBrk="1" latinLnBrk="0" hangingPunct="1">
+                  <a:lnSpc>
+                    <a:spcPct val="90000"/>
+                  </a:lnSpc>
+                  <a:spcBef>
+                    <a:spcPts val="500"/>
+                  </a:spcBef>
+                  <a:buFont typeface="Arial" panose="020B0604020202020204" pitchFamily="34" charset="0"/>
+                  <a:buChar char="•"/>
+                  <a:defRPr sz="1800" kern="1200">
+                    <a:solidFill>
+                      <a:schemeClr val="tx1"/>
+                    </a:solidFill>
+                    <a:latin typeface="+mn-lt"/>
+                    <a:ea typeface="+mn-ea"/>
+                    <a:cs typeface="+mn-cs"/>
+                  </a:defRPr>
+                </a:lvl8pPr>
+                <a:lvl9pPr marL="3886200" indent="-228600" algn="l" defTabSz="914400" rtl="0" eaLnBrk="1" latinLnBrk="0" hangingPunct="1">
+                  <a:lnSpc>
+                    <a:spcPct val="90000"/>
+                  </a:lnSpc>
+                  <a:spcBef>
+                    <a:spcPts val="500"/>
+                  </a:spcBef>
+                  <a:buFont typeface="Arial" panose="020B0604020202020204" pitchFamily="34" charset="0"/>
+                  <a:buChar char="•"/>
+                  <a:defRPr sz="1800" kern="1200">
+                    <a:solidFill>
+                      <a:schemeClr val="tx1"/>
+                    </a:solidFill>
+                    <a:latin typeface="+mn-lt"/>
+                    <a:ea typeface="+mn-ea"/>
+                    <a:cs typeface="+mn-cs"/>
+                  </a:defRPr>
+                </a:lvl9pPr>
+              </a:lstStyle>
+              <a:p>
+                <a:pPr>
+                  <a:spcBef>
+                    <a:spcPts val="0"/>
+                  </a:spcBef>
+                  <a:spcAft>
+                    <a:spcPts val="0"/>
+                  </a:spcAft>
+                </a:pPr>
+                <a:r>
+                  <a:rPr lang="en-US" sz="1400" dirty="0">
+                    <a:solidFill>
+                      <a:schemeClr val="tx1"/>
+                    </a:solidFill>
+                  </a:rPr>
+                  <a:t>Wrap up meeting</a:t>
+                </a:r>
+              </a:p>
+            </p:txBody>
+          </p:sp>
+          <p:pic>
+            <p:nvPicPr>
+              <p:cNvPr id="18" name="Content Placeholder 16" descr="Online meeting outline">
+                <a:extLst>
+                  <a:ext uri="{FF2B5EF4-FFF2-40B4-BE49-F238E27FC236}">
+                    <a16:creationId xmlns:a16="http://schemas.microsoft.com/office/drawing/2014/main" id="{F1284C9C-2508-7184-524D-51A790F5C3A8}"/>
+                  </a:ext>
+                </a:extLst>
+              </p:cNvPr>
+              <p:cNvPicPr>
+                <a:picLocks noChangeAspect="1"/>
+              </p:cNvPicPr>
+              <p:nvPr/>
+            </p:nvPicPr>
+            <p:blipFill>
+              <a:blip r:embed="rId2">
+                <a:extLst>
+                  <a:ext uri="{28A0092B-C50C-407E-A947-70E740481C1C}">
+                    <a14:useLocalDpi xmlns:a14="http://schemas.microsoft.com/office/drawing/2010/main" val="0"/>
+                  </a:ext>
+                  <a:ext uri="{96DAC541-7B7A-43D3-8B79-37D633B846F1}">
+                    <asvg:svgBlip xmlns:asvg="http://schemas.microsoft.com/office/drawing/2016/SVG/main" r:embed="rId3"/>
+                  </a:ext>
+                </a:extLst>
+              </a:blip>
+              <a:stretch>
+                <a:fillRect/>
+              </a:stretch>
+            </p:blipFill>
+            <p:spPr>
+              <a:xfrm>
+                <a:off x="4443499" y="2372979"/>
+                <a:ext cx="914400" cy="914400"/>
+              </a:xfrm>
+              <a:prstGeom prst="rect">
+                <a:avLst/>
+              </a:prstGeom>
+            </p:spPr>
+          </p:pic>
+        </p:grpSp>
+        <p:grpSp>
+          <p:nvGrpSpPr>
+            <p:cNvPr id="4" name="Group 3">
+              <a:extLst>
+                <a:ext uri="{FF2B5EF4-FFF2-40B4-BE49-F238E27FC236}">
+                  <a16:creationId xmlns:a16="http://schemas.microsoft.com/office/drawing/2014/main" id="{8560401B-37F4-8C20-EF8E-EAA78776F0D7}"/>
+                </a:ext>
+              </a:extLst>
+            </p:cNvPr>
+            <p:cNvGrpSpPr/>
+            <p:nvPr/>
+          </p:nvGrpSpPr>
+          <p:grpSpPr>
+            <a:xfrm>
+              <a:off x="1293506" y="2372979"/>
+              <a:ext cx="1477380" cy="1284727"/>
+              <a:chOff x="1342314" y="2372979"/>
+              <a:chExt cx="1477380" cy="1284727"/>
+            </a:xfrm>
+          </p:grpSpPr>
+          <p:sp>
+            <p:nvSpPr>
+              <p:cNvPr id="15" name="Text Placeholder 26">
+                <a:extLst>
+                  <a:ext uri="{FF2B5EF4-FFF2-40B4-BE49-F238E27FC236}">
+                    <a16:creationId xmlns:a16="http://schemas.microsoft.com/office/drawing/2014/main" id="{7B39AF6E-291E-9BCF-E03F-F3D75E131B2D}"/>
+                  </a:ext>
+                </a:extLst>
+              </p:cNvPr>
+              <p:cNvSpPr txBox="1">
+                <a:spLocks/>
+              </p:cNvSpPr>
+              <p:nvPr/>
+            </p:nvSpPr>
+            <p:spPr>
+              <a:xfrm>
+                <a:off x="1342314" y="3297343"/>
+                <a:ext cx="1477380" cy="360363"/>
+              </a:xfrm>
+              <a:prstGeom prst="rect">
+                <a:avLst/>
+              </a:prstGeom>
+            </p:spPr>
+            <p:txBody>
+              <a:bodyPr vert="horz" lIns="0" tIns="0" rIns="0" bIns="0" rtlCol="0" anchor="ctr">
+                <a:noAutofit/>
+              </a:bodyPr>
+              <a:lstStyle>
+                <a:lvl1pPr marL="0" indent="0" algn="ctr" defTabSz="914400" rtl="0" eaLnBrk="1" latinLnBrk="0" hangingPunct="1">
+                  <a:lnSpc>
+                    <a:spcPct val="100000"/>
+                  </a:lnSpc>
+                  <a:spcBef>
+                    <a:spcPts val="1000"/>
+                  </a:spcBef>
+                  <a:spcAft>
+                    <a:spcPts val="500"/>
+                  </a:spcAft>
+                  <a:buClr>
+                    <a:srgbClr val="EBAF44"/>
+                  </a:buClr>
+                  <a:buFont typeface="Arial" panose="020B0604020202020204" pitchFamily="34" charset="0"/>
+                  <a:buNone/>
+                  <a:defRPr sz="1800" kern="1200">
+                    <a:solidFill>
+                      <a:schemeClr val="tx1">
+                        <a:lumMod val="75000"/>
+                        <a:lumOff val="25000"/>
+                      </a:schemeClr>
+                    </a:solidFill>
+                    <a:latin typeface="Montserrat" panose="00000500000000000000" pitchFamily="50" charset="0"/>
+                    <a:ea typeface="+mn-ea"/>
+                    <a:cs typeface="+mn-cs"/>
+                  </a:defRPr>
+                </a:lvl1pPr>
+                <a:lvl2pPr marL="542925" indent="-276225" algn="l" defTabSz="914400" rtl="0" eaLnBrk="1" latinLnBrk="0" hangingPunct="1">
+                  <a:lnSpc>
+                    <a:spcPct val="100000"/>
+                  </a:lnSpc>
+                  <a:spcBef>
+                    <a:spcPts val="500"/>
+                  </a:spcBef>
+                  <a:spcAft>
+                    <a:spcPts val="500"/>
+                  </a:spcAft>
+                  <a:buClr>
+                    <a:srgbClr val="EBAF44"/>
+                  </a:buClr>
+                  <a:buFont typeface="Arial" panose="020B0604020202020204" pitchFamily="34" charset="0"/>
+                  <a:buChar char="•"/>
+                  <a:defRPr sz="1800" kern="1200">
+                    <a:solidFill>
+                      <a:schemeClr val="tx2"/>
+                    </a:solidFill>
+                    <a:latin typeface="Montserrat" panose="00000500000000000000" pitchFamily="50" charset="0"/>
+                    <a:ea typeface="+mn-ea"/>
+                    <a:cs typeface="+mn-cs"/>
+                  </a:defRPr>
+                </a:lvl2pPr>
+                <a:lvl3pPr marL="809625" indent="-266700" algn="l" defTabSz="914400" rtl="0" eaLnBrk="1" latinLnBrk="0" hangingPunct="1">
+                  <a:lnSpc>
+                    <a:spcPct val="100000"/>
+                  </a:lnSpc>
+                  <a:spcBef>
+                    <a:spcPts val="500"/>
+                  </a:spcBef>
+                  <a:spcAft>
+                    <a:spcPts val="500"/>
+                  </a:spcAft>
+                  <a:buClr>
+                    <a:srgbClr val="EBAF44"/>
+                  </a:buClr>
+                  <a:buFont typeface="Arial" panose="020B0604020202020204" pitchFamily="34" charset="0"/>
+                  <a:buChar char="•"/>
+                  <a:defRPr sz="1800" kern="1200">
+                    <a:solidFill>
+                      <a:schemeClr val="tx2"/>
+                    </a:solidFill>
+                    <a:latin typeface="Montserrat" panose="00000500000000000000" pitchFamily="50" charset="0"/>
+                    <a:ea typeface="+mn-ea"/>
+                    <a:cs typeface="+mn-cs"/>
+                  </a:defRPr>
+                </a:lvl3pPr>
+                <a:lvl4pPr marL="1076325" indent="-266700" algn="l" defTabSz="914400" rtl="0" eaLnBrk="1" latinLnBrk="0" hangingPunct="1">
+                  <a:lnSpc>
+                    <a:spcPct val="100000"/>
+                  </a:lnSpc>
+                  <a:spcBef>
+                    <a:spcPts val="500"/>
+                  </a:spcBef>
+                  <a:spcAft>
+                    <a:spcPts val="500"/>
+                  </a:spcAft>
+                  <a:buClr>
+                    <a:srgbClr val="EBAF44"/>
+                  </a:buClr>
+                  <a:buFont typeface="Arial" panose="020B0604020202020204" pitchFamily="34" charset="0"/>
+                  <a:buChar char="•"/>
+                  <a:defRPr sz="1800" kern="1200">
+                    <a:solidFill>
+                      <a:schemeClr val="tx2"/>
+                    </a:solidFill>
+                    <a:latin typeface="Montserrat" panose="00000500000000000000" pitchFamily="50" charset="0"/>
+                    <a:ea typeface="+mn-ea"/>
+                    <a:cs typeface="+mn-cs"/>
+                  </a:defRPr>
+                </a:lvl4pPr>
+                <a:lvl5pPr marL="1343025" indent="-266700" algn="l" defTabSz="914400" rtl="0" eaLnBrk="1" latinLnBrk="0" hangingPunct="1">
+                  <a:lnSpc>
+                    <a:spcPct val="100000"/>
+                  </a:lnSpc>
+                  <a:spcBef>
+                    <a:spcPts val="500"/>
+                  </a:spcBef>
+                  <a:spcAft>
+                    <a:spcPts val="500"/>
+                  </a:spcAft>
+                  <a:buClr>
+                    <a:srgbClr val="EBAF44"/>
+                  </a:buClr>
+                  <a:buFont typeface="Arial" panose="020B0604020202020204" pitchFamily="34" charset="0"/>
+                  <a:buChar char="•"/>
+                  <a:defRPr sz="1800" kern="1200">
+                    <a:solidFill>
+                      <a:schemeClr val="tx2"/>
+                    </a:solidFill>
+                    <a:latin typeface="Montserrat" panose="00000500000000000000" pitchFamily="50" charset="0"/>
+                    <a:ea typeface="+mn-ea"/>
+                    <a:cs typeface="+mn-cs"/>
+                  </a:defRPr>
+                </a:lvl5pPr>
+                <a:lvl6pPr marL="2514600" indent="-228600" algn="l" defTabSz="914400" rtl="0" eaLnBrk="1" latinLnBrk="0" hangingPunct="1">
+                  <a:lnSpc>
+                    <a:spcPct val="90000"/>
+                  </a:lnSpc>
+                  <a:spcBef>
+                    <a:spcPts val="500"/>
+                  </a:spcBef>
+                  <a:buFont typeface="Arial" panose="020B0604020202020204" pitchFamily="34" charset="0"/>
+                  <a:buChar char="•"/>
+                  <a:defRPr sz="1800" kern="1200">
+                    <a:solidFill>
+                      <a:schemeClr val="tx1"/>
+                    </a:solidFill>
+                    <a:latin typeface="+mn-lt"/>
+                    <a:ea typeface="+mn-ea"/>
+                    <a:cs typeface="+mn-cs"/>
+                  </a:defRPr>
+                </a:lvl6pPr>
+                <a:lvl7pPr marL="2971800" indent="-228600" algn="l" defTabSz="914400" rtl="0" eaLnBrk="1" latinLnBrk="0" hangingPunct="1">
+                  <a:lnSpc>
+                    <a:spcPct val="90000"/>
+                  </a:lnSpc>
+                  <a:spcBef>
+                    <a:spcPts val="500"/>
+                  </a:spcBef>
+                  <a:buFont typeface="Arial" panose="020B0604020202020204" pitchFamily="34" charset="0"/>
+                  <a:buChar char="•"/>
+                  <a:defRPr sz="1800" kern="1200">
+                    <a:solidFill>
+                      <a:schemeClr val="tx1"/>
+                    </a:solidFill>
+                    <a:latin typeface="+mn-lt"/>
+                    <a:ea typeface="+mn-ea"/>
+                    <a:cs typeface="+mn-cs"/>
+                  </a:defRPr>
+                </a:lvl7pPr>
+                <a:lvl8pPr marL="3429000" indent="-228600" algn="l" defTabSz="914400" rtl="0" eaLnBrk="1" latinLnBrk="0" hangingPunct="1">
+                  <a:lnSpc>
+                    <a:spcPct val="90000"/>
+                  </a:lnSpc>
+                  <a:spcBef>
+                    <a:spcPts val="500"/>
+                  </a:spcBef>
+                  <a:buFont typeface="Arial" panose="020B0604020202020204" pitchFamily="34" charset="0"/>
+                  <a:buChar char="•"/>
+                  <a:defRPr sz="1800" kern="1200">
+                    <a:solidFill>
+                      <a:schemeClr val="tx1"/>
+                    </a:solidFill>
+                    <a:latin typeface="+mn-lt"/>
+                    <a:ea typeface="+mn-ea"/>
+                    <a:cs typeface="+mn-cs"/>
+                  </a:defRPr>
+                </a:lvl8pPr>
+                <a:lvl9pPr marL="3886200" indent="-228600" algn="l" defTabSz="914400" rtl="0" eaLnBrk="1" latinLnBrk="0" hangingPunct="1">
+                  <a:lnSpc>
+                    <a:spcPct val="90000"/>
+                  </a:lnSpc>
+                  <a:spcBef>
+                    <a:spcPts val="500"/>
+                  </a:spcBef>
+                  <a:buFont typeface="Arial" panose="020B0604020202020204" pitchFamily="34" charset="0"/>
+                  <a:buChar char="•"/>
+                  <a:defRPr sz="1800" kern="1200">
+                    <a:solidFill>
+                      <a:schemeClr val="tx1"/>
+                    </a:solidFill>
+                    <a:latin typeface="+mn-lt"/>
+                    <a:ea typeface="+mn-ea"/>
+                    <a:cs typeface="+mn-cs"/>
+                  </a:defRPr>
+                </a:lvl9pPr>
+              </a:lstStyle>
+              <a:p>
+                <a:pPr>
+                  <a:spcBef>
+                    <a:spcPts val="0"/>
+                  </a:spcBef>
+                  <a:spcAft>
+                    <a:spcPts val="0"/>
+                  </a:spcAft>
+                </a:pPr>
+                <a:r>
+                  <a:rPr lang="en-US" sz="1400" dirty="0">
+                    <a:solidFill>
+                      <a:schemeClr val="tx1"/>
+                    </a:solidFill>
+                  </a:rPr>
+                  <a:t>Cloud-based simulations</a:t>
+                </a:r>
+              </a:p>
+            </p:txBody>
+          </p:sp>
+          <p:pic>
+            <p:nvPicPr>
+              <p:cNvPr id="16" name="Graphic 15" descr="Cloud Computing outline">
+                <a:extLst>
+                  <a:ext uri="{FF2B5EF4-FFF2-40B4-BE49-F238E27FC236}">
+                    <a16:creationId xmlns:a16="http://schemas.microsoft.com/office/drawing/2014/main" id="{88FD2430-AB02-D559-8FBA-E282DD33FE9F}"/>
+                  </a:ext>
+                </a:extLst>
+              </p:cNvPr>
+              <p:cNvPicPr>
+                <a:picLocks noChangeAspect="1"/>
+              </p:cNvPicPr>
+              <p:nvPr/>
+            </p:nvPicPr>
+            <p:blipFill>
+              <a:blip r:embed="rId4">
+                <a:extLst>
+                  <a:ext uri="{28A0092B-C50C-407E-A947-70E740481C1C}">
+                    <a14:useLocalDpi xmlns:a14="http://schemas.microsoft.com/office/drawing/2010/main" val="0"/>
+                  </a:ext>
+                  <a:ext uri="{96DAC541-7B7A-43D3-8B79-37D633B846F1}">
+                    <asvg:svgBlip xmlns:asvg="http://schemas.microsoft.com/office/drawing/2016/SVG/main" r:embed="rId5"/>
+                  </a:ext>
+                </a:extLst>
+              </a:blip>
+              <a:stretch>
+                <a:fillRect/>
+              </a:stretch>
+            </p:blipFill>
+            <p:spPr>
+              <a:xfrm>
+                <a:off x="1693476" y="2372979"/>
+                <a:ext cx="914400" cy="914400"/>
+              </a:xfrm>
+              <a:prstGeom prst="rect">
+                <a:avLst/>
+              </a:prstGeom>
+            </p:spPr>
+          </p:pic>
+        </p:grpSp>
+        <p:sp>
+          <p:nvSpPr>
+            <p:cNvPr id="5" name="Arrow: Right 4">
+              <a:extLst>
+                <a:ext uri="{FF2B5EF4-FFF2-40B4-BE49-F238E27FC236}">
+                  <a16:creationId xmlns:a16="http://schemas.microsoft.com/office/drawing/2014/main" id="{2AD9D407-F370-1877-D080-424BA7DE7838}"/>
+                </a:ext>
+              </a:extLst>
+            </p:cNvPr>
+            <p:cNvSpPr/>
+            <p:nvPr/>
+          </p:nvSpPr>
+          <p:spPr>
+            <a:xfrm>
+              <a:off x="1098267" y="2838994"/>
+              <a:ext cx="390478" cy="209006"/>
+            </a:xfrm>
+            <a:prstGeom prst="rightArrow">
+              <a:avLst/>
+            </a:prstGeom>
+            <a:solidFill>
+              <a:srgbClr val="EBAF44"/>
+            </a:solidFill>
+            <a:ln>
+              <a:solidFill>
+                <a:srgbClr val="EBAF44"/>
+              </a:solidFill>
+            </a:ln>
+          </p:spPr>
+          <p:style>
+            <a:lnRef idx="2">
+              <a:schemeClr val="accent1">
+                <a:shade val="50000"/>
+              </a:schemeClr>
+            </a:lnRef>
+            <a:fillRef idx="1">
+              <a:schemeClr val="accent1"/>
+            </a:fillRef>
+            <a:effectRef idx="0">
+              <a:schemeClr val="accent1"/>
+            </a:effectRef>
+            <a:fontRef idx="minor">
+              <a:schemeClr val="lt1"/>
+            </a:fontRef>
+          </p:style>
+          <p:txBody>
+            <a:bodyPr rtlCol="0" anchor="ctr"/>
+            <a:lstStyle/>
+            <a:p>
+              <a:pPr algn="ctr"/>
+              <a:endParaRPr lang="en-US"/>
+            </a:p>
+          </p:txBody>
+        </p:sp>
+        <p:sp>
+          <p:nvSpPr>
+            <p:cNvPr id="6" name="Text Placeholder 26">
+              <a:extLst>
+                <a:ext uri="{FF2B5EF4-FFF2-40B4-BE49-F238E27FC236}">
+                  <a16:creationId xmlns:a16="http://schemas.microsoft.com/office/drawing/2014/main" id="{3367008B-B2E8-9707-F2A4-4DDCD392998B}"/>
+                </a:ext>
+              </a:extLst>
+            </p:cNvPr>
+            <p:cNvSpPr txBox="1">
+              <a:spLocks/>
+            </p:cNvSpPr>
+            <p:nvPr/>
+          </p:nvSpPr>
+          <p:spPr>
+            <a:xfrm>
+              <a:off x="1023681" y="2492614"/>
+              <a:ext cx="504814" cy="360363"/>
+            </a:xfrm>
+            <a:prstGeom prst="rect">
+              <a:avLst/>
+            </a:prstGeom>
+          </p:spPr>
+          <p:txBody>
+            <a:bodyPr vert="horz" lIns="0" tIns="0" rIns="0" bIns="0" rtlCol="0" anchor="ctr">
+              <a:noAutofit/>
+            </a:bodyPr>
+            <a:lstStyle>
+              <a:lvl1pPr marL="0" indent="0" algn="ctr" defTabSz="914400" rtl="0" eaLnBrk="1" latinLnBrk="0" hangingPunct="1">
+                <a:lnSpc>
+                  <a:spcPct val="100000"/>
+                </a:lnSpc>
+                <a:spcBef>
+                  <a:spcPts val="1000"/>
+                </a:spcBef>
+                <a:spcAft>
+                  <a:spcPts val="500"/>
+                </a:spcAft>
+                <a:buClr>
+                  <a:srgbClr val="EBAF44"/>
+                </a:buClr>
+                <a:buFont typeface="Arial" panose="020B0604020202020204" pitchFamily="34" charset="0"/>
+                <a:buNone/>
+                <a:defRPr sz="1800" kern="1200">
+                  <a:solidFill>
+                    <a:schemeClr val="tx1">
+                      <a:lumMod val="75000"/>
+                      <a:lumOff val="25000"/>
+                    </a:schemeClr>
+                  </a:solidFill>
+                  <a:latin typeface="Montserrat" panose="00000500000000000000" pitchFamily="50" charset="0"/>
+                  <a:ea typeface="+mn-ea"/>
+                  <a:cs typeface="+mn-cs"/>
+                </a:defRPr>
+              </a:lvl1pPr>
+              <a:lvl2pPr marL="542925" indent="-276225" algn="l" defTabSz="914400" rtl="0" eaLnBrk="1" latinLnBrk="0" hangingPunct="1">
+                <a:lnSpc>
+                  <a:spcPct val="100000"/>
+                </a:lnSpc>
+                <a:spcBef>
+                  <a:spcPts val="500"/>
+                </a:spcBef>
+                <a:spcAft>
+                  <a:spcPts val="500"/>
+                </a:spcAft>
+                <a:buClr>
+                  <a:srgbClr val="EBAF44"/>
+                </a:buClr>
+                <a:buFont typeface="Arial" panose="020B0604020202020204" pitchFamily="34" charset="0"/>
+                <a:buChar char="•"/>
+                <a:defRPr sz="1800" kern="1200">
+                  <a:solidFill>
+                    <a:schemeClr val="tx2"/>
+                  </a:solidFill>
+                  <a:latin typeface="Montserrat" panose="00000500000000000000" pitchFamily="50" charset="0"/>
+                  <a:ea typeface="+mn-ea"/>
+                  <a:cs typeface="+mn-cs"/>
+                </a:defRPr>
+              </a:lvl2pPr>
+              <a:lvl3pPr marL="809625" indent="-266700" algn="l" defTabSz="914400" rtl="0" eaLnBrk="1" latinLnBrk="0" hangingPunct="1">
+                <a:lnSpc>
+                  <a:spcPct val="100000"/>
+                </a:lnSpc>
+                <a:spcBef>
+                  <a:spcPts val="500"/>
+                </a:spcBef>
+                <a:spcAft>
+                  <a:spcPts val="500"/>
+                </a:spcAft>
+                <a:buClr>
+                  <a:srgbClr val="EBAF44"/>
+                </a:buClr>
+                <a:buFont typeface="Arial" panose="020B0604020202020204" pitchFamily="34" charset="0"/>
+                <a:buChar char="•"/>
+                <a:defRPr sz="1800" kern="1200">
+                  <a:solidFill>
+                    <a:schemeClr val="tx2"/>
+                  </a:solidFill>
+                  <a:latin typeface="Montserrat" panose="00000500000000000000" pitchFamily="50" charset="0"/>
+                  <a:ea typeface="+mn-ea"/>
+                  <a:cs typeface="+mn-cs"/>
+                </a:defRPr>
+              </a:lvl3pPr>
+              <a:lvl4pPr marL="1076325" indent="-266700" algn="l" defTabSz="914400" rtl="0" eaLnBrk="1" latinLnBrk="0" hangingPunct="1">
+                <a:lnSpc>
+                  <a:spcPct val="100000"/>
+                </a:lnSpc>
+                <a:spcBef>
+                  <a:spcPts val="500"/>
+                </a:spcBef>
+                <a:spcAft>
+                  <a:spcPts val="500"/>
+                </a:spcAft>
+                <a:buClr>
+                  <a:srgbClr val="EBAF44"/>
+                </a:buClr>
+                <a:buFont typeface="Arial" panose="020B0604020202020204" pitchFamily="34" charset="0"/>
+                <a:buChar char="•"/>
+                <a:defRPr sz="1800" kern="1200">
+                  <a:solidFill>
+                    <a:schemeClr val="tx2"/>
+                  </a:solidFill>
+                  <a:latin typeface="Montserrat" panose="00000500000000000000" pitchFamily="50" charset="0"/>
+                  <a:ea typeface="+mn-ea"/>
+                  <a:cs typeface="+mn-cs"/>
+                </a:defRPr>
+              </a:lvl4pPr>
+              <a:lvl5pPr marL="1343025" indent="-266700" algn="l" defTabSz="914400" rtl="0" eaLnBrk="1" latinLnBrk="0" hangingPunct="1">
+                <a:lnSpc>
+                  <a:spcPct val="100000"/>
+                </a:lnSpc>
+                <a:spcBef>
+                  <a:spcPts val="500"/>
+                </a:spcBef>
+                <a:spcAft>
+                  <a:spcPts val="500"/>
+                </a:spcAft>
+                <a:buClr>
+                  <a:srgbClr val="EBAF44"/>
+                </a:buClr>
+                <a:buFont typeface="Arial" panose="020B0604020202020204" pitchFamily="34" charset="0"/>
+                <a:buChar char="•"/>
+                <a:defRPr sz="1800" kern="1200">
+                  <a:solidFill>
+                    <a:schemeClr val="tx2"/>
+                  </a:solidFill>
+                  <a:latin typeface="Montserrat" panose="00000500000000000000" pitchFamily="50" charset="0"/>
+                  <a:ea typeface="+mn-ea"/>
+                  <a:cs typeface="+mn-cs"/>
+                </a:defRPr>
+              </a:lvl5pPr>
+              <a:lvl6pPr marL="2514600" indent="-228600" algn="l" defTabSz="914400" rtl="0" eaLnBrk="1" latinLnBrk="0" hangingPunct="1">
+                <a:lnSpc>
+                  <a:spcPct val="90000"/>
+                </a:lnSpc>
+                <a:spcBef>
+                  <a:spcPts val="500"/>
+                </a:spcBef>
+                <a:buFont typeface="Arial" panose="020B0604020202020204" pitchFamily="34" charset="0"/>
+                <a:buChar char="•"/>
+                <a:defRPr sz="1800" kern="1200">
+                  <a:solidFill>
+                    <a:schemeClr val="tx1"/>
+                  </a:solidFill>
+                  <a:latin typeface="+mn-lt"/>
+                  <a:ea typeface="+mn-ea"/>
+                  <a:cs typeface="+mn-cs"/>
+                </a:defRPr>
+              </a:lvl6pPr>
+              <a:lvl7pPr marL="2971800" indent="-228600" algn="l" defTabSz="914400" rtl="0" eaLnBrk="1" latinLnBrk="0" hangingPunct="1">
+                <a:lnSpc>
+                  <a:spcPct val="90000"/>
+                </a:lnSpc>
+                <a:spcBef>
+                  <a:spcPts val="500"/>
+                </a:spcBef>
+                <a:buFont typeface="Arial" panose="020B0604020202020204" pitchFamily="34" charset="0"/>
+                <a:buChar char="•"/>
+                <a:defRPr sz="1800" kern="1200">
+                  <a:solidFill>
+                    <a:schemeClr val="tx1"/>
+                  </a:solidFill>
+                  <a:latin typeface="+mn-lt"/>
+                  <a:ea typeface="+mn-ea"/>
+                  <a:cs typeface="+mn-cs"/>
+                </a:defRPr>
+              </a:lvl7pPr>
+              <a:lvl8pPr marL="3429000" indent="-228600" algn="l" defTabSz="914400" rtl="0" eaLnBrk="1" latinLnBrk="0" hangingPunct="1">
+                <a:lnSpc>
+                  <a:spcPct val="90000"/>
+                </a:lnSpc>
+                <a:spcBef>
+                  <a:spcPts val="500"/>
+                </a:spcBef>
+                <a:buFont typeface="Arial" panose="020B0604020202020204" pitchFamily="34" charset="0"/>
+                <a:buChar char="•"/>
+                <a:defRPr sz="1800" kern="1200">
+                  <a:solidFill>
+                    <a:schemeClr val="tx1"/>
+                  </a:solidFill>
+                  <a:latin typeface="+mn-lt"/>
+                  <a:ea typeface="+mn-ea"/>
+                  <a:cs typeface="+mn-cs"/>
+                </a:defRPr>
+              </a:lvl8pPr>
+              <a:lvl9pPr marL="3886200" indent="-228600" algn="l" defTabSz="914400" rtl="0" eaLnBrk="1" latinLnBrk="0" hangingPunct="1">
+                <a:lnSpc>
+                  <a:spcPct val="90000"/>
+                </a:lnSpc>
+                <a:spcBef>
+                  <a:spcPts val="500"/>
+                </a:spcBef>
+                <a:buFont typeface="Arial" panose="020B0604020202020204" pitchFamily="34" charset="0"/>
+                <a:buChar char="•"/>
+                <a:defRPr sz="1800" kern="1200">
+                  <a:solidFill>
+                    <a:schemeClr val="tx1"/>
+                  </a:solidFill>
+                  <a:latin typeface="+mn-lt"/>
+                  <a:ea typeface="+mn-ea"/>
+                  <a:cs typeface="+mn-cs"/>
+                </a:defRPr>
+              </a:lvl9pPr>
+            </a:lstStyle>
+            <a:p>
+              <a:pPr>
+                <a:spcBef>
+                  <a:spcPts val="0"/>
+                </a:spcBef>
+                <a:spcAft>
+                  <a:spcPts val="0"/>
+                </a:spcAft>
+              </a:pPr>
+              <a:r>
+                <a:rPr lang="en-US" sz="1000" dirty="0">
+                  <a:solidFill>
+                    <a:schemeClr val="tx1"/>
+                  </a:solidFill>
+                </a:rPr>
+                <a:t>CAD files</a:t>
+              </a:r>
+            </a:p>
+          </p:txBody>
+        </p:sp>
+        <p:sp>
+          <p:nvSpPr>
+            <p:cNvPr id="7" name="Arrow: Right 6">
+              <a:extLst>
+                <a:ext uri="{FF2B5EF4-FFF2-40B4-BE49-F238E27FC236}">
+                  <a16:creationId xmlns:a16="http://schemas.microsoft.com/office/drawing/2014/main" id="{47BFD912-78DC-5E2D-3FF3-A0DC8B727045}"/>
+                </a:ext>
+              </a:extLst>
+            </p:cNvPr>
+            <p:cNvSpPr/>
+            <p:nvPr/>
+          </p:nvSpPr>
+          <p:spPr>
+            <a:xfrm>
+              <a:off x="2618769" y="2830179"/>
+              <a:ext cx="390478" cy="209006"/>
+            </a:xfrm>
+            <a:prstGeom prst="rightArrow">
+              <a:avLst/>
+            </a:prstGeom>
+            <a:solidFill>
+              <a:srgbClr val="EBAF44"/>
+            </a:solidFill>
+            <a:ln>
+              <a:solidFill>
+                <a:srgbClr val="EBAF44"/>
+              </a:solidFill>
+            </a:ln>
+          </p:spPr>
+          <p:style>
+            <a:lnRef idx="2">
+              <a:schemeClr val="accent1">
+                <a:shade val="50000"/>
+              </a:schemeClr>
+            </a:lnRef>
+            <a:fillRef idx="1">
+              <a:schemeClr val="accent1"/>
+            </a:fillRef>
+            <a:effectRef idx="0">
+              <a:schemeClr val="accent1"/>
+            </a:effectRef>
+            <a:fontRef idx="minor">
+              <a:schemeClr val="lt1"/>
+            </a:fontRef>
+          </p:style>
+          <p:txBody>
+            <a:bodyPr rtlCol="0" anchor="ctr"/>
+            <a:lstStyle/>
+            <a:p>
+              <a:pPr algn="ctr"/>
+              <a:endParaRPr lang="en-US"/>
+            </a:p>
+          </p:txBody>
+        </p:sp>
+        <p:sp>
+          <p:nvSpPr>
+            <p:cNvPr id="8" name="Arrow: Right 7">
+              <a:extLst>
+                <a:ext uri="{FF2B5EF4-FFF2-40B4-BE49-F238E27FC236}">
+                  <a16:creationId xmlns:a16="http://schemas.microsoft.com/office/drawing/2014/main" id="{EA99F364-E98C-6169-9198-83B3BD758D77}"/>
+                </a:ext>
+              </a:extLst>
+            </p:cNvPr>
+            <p:cNvSpPr/>
+            <p:nvPr/>
+          </p:nvSpPr>
+          <p:spPr>
+            <a:xfrm>
+              <a:off x="3966770" y="2830179"/>
+              <a:ext cx="390478" cy="209006"/>
+            </a:xfrm>
+            <a:prstGeom prst="rightArrow">
+              <a:avLst/>
+            </a:prstGeom>
+            <a:solidFill>
+              <a:srgbClr val="EBAF44"/>
+            </a:solidFill>
+            <a:ln>
+              <a:solidFill>
+                <a:srgbClr val="EBAF44"/>
+              </a:solidFill>
+            </a:ln>
+          </p:spPr>
+          <p:style>
+            <a:lnRef idx="2">
+              <a:schemeClr val="accent1">
+                <a:shade val="50000"/>
+              </a:schemeClr>
+            </a:lnRef>
+            <a:fillRef idx="1">
+              <a:schemeClr val="accent1"/>
+            </a:fillRef>
+            <a:effectRef idx="0">
+              <a:schemeClr val="accent1"/>
+            </a:effectRef>
+            <a:fontRef idx="minor">
+              <a:schemeClr val="lt1"/>
+            </a:fontRef>
+          </p:style>
+          <p:txBody>
+            <a:bodyPr rtlCol="0" anchor="ctr"/>
+            <a:lstStyle/>
+            <a:p>
+              <a:pPr algn="ctr"/>
+              <a:endParaRPr lang="en-US"/>
+            </a:p>
+          </p:txBody>
+        </p:sp>
+        <p:grpSp>
+          <p:nvGrpSpPr>
+            <p:cNvPr id="9" name="Group 8">
+              <a:extLst>
+                <a:ext uri="{FF2B5EF4-FFF2-40B4-BE49-F238E27FC236}">
+                  <a16:creationId xmlns:a16="http://schemas.microsoft.com/office/drawing/2014/main" id="{07A4D143-4CE0-ED52-A88F-3552C5C3D378}"/>
+                </a:ext>
+              </a:extLst>
+            </p:cNvPr>
+            <p:cNvGrpSpPr/>
+            <p:nvPr/>
+          </p:nvGrpSpPr>
+          <p:grpSpPr>
+            <a:xfrm>
+              <a:off x="0" y="2372300"/>
+              <a:ext cx="1195890" cy="1285406"/>
+              <a:chOff x="0" y="2372300"/>
+              <a:chExt cx="1195890" cy="1285406"/>
+            </a:xfrm>
+          </p:grpSpPr>
+          <p:sp>
+            <p:nvSpPr>
+              <p:cNvPr id="13" name="Text Placeholder 26">
+                <a:extLst>
+                  <a:ext uri="{FF2B5EF4-FFF2-40B4-BE49-F238E27FC236}">
+                    <a16:creationId xmlns:a16="http://schemas.microsoft.com/office/drawing/2014/main" id="{73CDC50F-271F-952D-EF15-9D943EB3C0AD}"/>
+                  </a:ext>
+                </a:extLst>
+              </p:cNvPr>
+              <p:cNvSpPr txBox="1">
+                <a:spLocks/>
+              </p:cNvSpPr>
+              <p:nvPr/>
+            </p:nvSpPr>
+            <p:spPr>
+              <a:xfrm>
+                <a:off x="0" y="3297343"/>
+                <a:ext cx="1195890" cy="360363"/>
+              </a:xfrm>
+              <a:prstGeom prst="rect">
+                <a:avLst/>
+              </a:prstGeom>
+            </p:spPr>
+            <p:txBody>
+              <a:bodyPr vert="horz" lIns="0" tIns="0" rIns="0" bIns="0" rtlCol="0" anchor="ctr">
+                <a:noAutofit/>
+              </a:bodyPr>
+              <a:lstStyle>
+                <a:lvl1pPr marL="0" indent="0" algn="ctr" defTabSz="914400" rtl="0" eaLnBrk="1" latinLnBrk="0" hangingPunct="1">
+                  <a:lnSpc>
+                    <a:spcPct val="100000"/>
+                  </a:lnSpc>
+                  <a:spcBef>
+                    <a:spcPts val="1000"/>
+                  </a:spcBef>
+                  <a:spcAft>
+                    <a:spcPts val="500"/>
+                  </a:spcAft>
+                  <a:buClr>
+                    <a:srgbClr val="EBAF44"/>
+                  </a:buClr>
+                  <a:buFont typeface="Arial" panose="020B0604020202020204" pitchFamily="34" charset="0"/>
+                  <a:buNone/>
+                  <a:defRPr sz="1800" kern="1200">
+                    <a:solidFill>
+                      <a:schemeClr val="tx1">
+                        <a:lumMod val="75000"/>
+                        <a:lumOff val="25000"/>
+                      </a:schemeClr>
+                    </a:solidFill>
+                    <a:latin typeface="Montserrat" panose="00000500000000000000" pitchFamily="50" charset="0"/>
+                    <a:ea typeface="+mn-ea"/>
+                    <a:cs typeface="+mn-cs"/>
+                  </a:defRPr>
+                </a:lvl1pPr>
+                <a:lvl2pPr marL="542925" indent="-276225" algn="l" defTabSz="914400" rtl="0" eaLnBrk="1" latinLnBrk="0" hangingPunct="1">
+                  <a:lnSpc>
+                    <a:spcPct val="100000"/>
+                  </a:lnSpc>
+                  <a:spcBef>
+                    <a:spcPts val="500"/>
+                  </a:spcBef>
+                  <a:spcAft>
+                    <a:spcPts val="500"/>
+                  </a:spcAft>
+                  <a:buClr>
+                    <a:srgbClr val="EBAF44"/>
+                  </a:buClr>
+                  <a:buFont typeface="Arial" panose="020B0604020202020204" pitchFamily="34" charset="0"/>
+                  <a:buChar char="•"/>
+                  <a:defRPr sz="1800" kern="1200">
+                    <a:solidFill>
+                      <a:schemeClr val="tx2"/>
+                    </a:solidFill>
+                    <a:latin typeface="Montserrat" panose="00000500000000000000" pitchFamily="50" charset="0"/>
+                    <a:ea typeface="+mn-ea"/>
+                    <a:cs typeface="+mn-cs"/>
+                  </a:defRPr>
+                </a:lvl2pPr>
+                <a:lvl3pPr marL="809625" indent="-266700" algn="l" defTabSz="914400" rtl="0" eaLnBrk="1" latinLnBrk="0" hangingPunct="1">
+                  <a:lnSpc>
+                    <a:spcPct val="100000"/>
+                  </a:lnSpc>
+                  <a:spcBef>
+                    <a:spcPts val="500"/>
+                  </a:spcBef>
+                  <a:spcAft>
+                    <a:spcPts val="500"/>
+                  </a:spcAft>
+                  <a:buClr>
+                    <a:srgbClr val="EBAF44"/>
+                  </a:buClr>
+                  <a:buFont typeface="Arial" panose="020B0604020202020204" pitchFamily="34" charset="0"/>
+                  <a:buChar char="•"/>
+                  <a:defRPr sz="1800" kern="1200">
+                    <a:solidFill>
+                      <a:schemeClr val="tx2"/>
+                    </a:solidFill>
+                    <a:latin typeface="Montserrat" panose="00000500000000000000" pitchFamily="50" charset="0"/>
+                    <a:ea typeface="+mn-ea"/>
+                    <a:cs typeface="+mn-cs"/>
+                  </a:defRPr>
+                </a:lvl3pPr>
+                <a:lvl4pPr marL="1076325" indent="-266700" algn="l" defTabSz="914400" rtl="0" eaLnBrk="1" latinLnBrk="0" hangingPunct="1">
+                  <a:lnSpc>
+                    <a:spcPct val="100000"/>
+                  </a:lnSpc>
+                  <a:spcBef>
+                    <a:spcPts val="500"/>
+                  </a:spcBef>
+                  <a:spcAft>
+                    <a:spcPts val="500"/>
+                  </a:spcAft>
+                  <a:buClr>
+                    <a:srgbClr val="EBAF44"/>
+                  </a:buClr>
+                  <a:buFont typeface="Arial" panose="020B0604020202020204" pitchFamily="34" charset="0"/>
+                  <a:buChar char="•"/>
+                  <a:defRPr sz="1800" kern="1200">
+                    <a:solidFill>
+                      <a:schemeClr val="tx2"/>
+                    </a:solidFill>
+                    <a:latin typeface="Montserrat" panose="00000500000000000000" pitchFamily="50" charset="0"/>
+                    <a:ea typeface="+mn-ea"/>
+                    <a:cs typeface="+mn-cs"/>
+                  </a:defRPr>
+                </a:lvl4pPr>
+                <a:lvl5pPr marL="1343025" indent="-266700" algn="l" defTabSz="914400" rtl="0" eaLnBrk="1" latinLnBrk="0" hangingPunct="1">
+                  <a:lnSpc>
+                    <a:spcPct val="100000"/>
+                  </a:lnSpc>
+                  <a:spcBef>
+                    <a:spcPts val="500"/>
+                  </a:spcBef>
+                  <a:spcAft>
+                    <a:spcPts val="500"/>
+                  </a:spcAft>
+                  <a:buClr>
+                    <a:srgbClr val="EBAF44"/>
+                  </a:buClr>
+                  <a:buFont typeface="Arial" panose="020B0604020202020204" pitchFamily="34" charset="0"/>
+                  <a:buChar char="•"/>
+                  <a:defRPr sz="1800" kern="1200">
+                    <a:solidFill>
+                      <a:schemeClr val="tx2"/>
+                    </a:solidFill>
+                    <a:latin typeface="Montserrat" panose="00000500000000000000" pitchFamily="50" charset="0"/>
+                    <a:ea typeface="+mn-ea"/>
+                    <a:cs typeface="+mn-cs"/>
+                  </a:defRPr>
+                </a:lvl5pPr>
+                <a:lvl6pPr marL="2514600" indent="-228600" algn="l" defTabSz="914400" rtl="0" eaLnBrk="1" latinLnBrk="0" hangingPunct="1">
+                  <a:lnSpc>
+                    <a:spcPct val="90000"/>
+                  </a:lnSpc>
+                  <a:spcBef>
+                    <a:spcPts val="500"/>
+                  </a:spcBef>
+                  <a:buFont typeface="Arial" panose="020B0604020202020204" pitchFamily="34" charset="0"/>
+                  <a:buChar char="•"/>
+                  <a:defRPr sz="1800" kern="1200">
+                    <a:solidFill>
+                      <a:schemeClr val="tx1"/>
+                    </a:solidFill>
+                    <a:latin typeface="+mn-lt"/>
+                    <a:ea typeface="+mn-ea"/>
+                    <a:cs typeface="+mn-cs"/>
+                  </a:defRPr>
+                </a:lvl6pPr>
+                <a:lvl7pPr marL="2971800" indent="-228600" algn="l" defTabSz="914400" rtl="0" eaLnBrk="1" latinLnBrk="0" hangingPunct="1">
+                  <a:lnSpc>
+                    <a:spcPct val="90000"/>
+                  </a:lnSpc>
+                  <a:spcBef>
+                    <a:spcPts val="500"/>
+                  </a:spcBef>
+                  <a:buFont typeface="Arial" panose="020B0604020202020204" pitchFamily="34" charset="0"/>
+                  <a:buChar char="•"/>
+                  <a:defRPr sz="1800" kern="1200">
+                    <a:solidFill>
+                      <a:schemeClr val="tx1"/>
+                    </a:solidFill>
+                    <a:latin typeface="+mn-lt"/>
+                    <a:ea typeface="+mn-ea"/>
+                    <a:cs typeface="+mn-cs"/>
+                  </a:defRPr>
+                </a:lvl7pPr>
+                <a:lvl8pPr marL="3429000" indent="-228600" algn="l" defTabSz="914400" rtl="0" eaLnBrk="1" latinLnBrk="0" hangingPunct="1">
+                  <a:lnSpc>
+                    <a:spcPct val="90000"/>
+                  </a:lnSpc>
+                  <a:spcBef>
+                    <a:spcPts val="500"/>
+                  </a:spcBef>
+                  <a:buFont typeface="Arial" panose="020B0604020202020204" pitchFamily="34" charset="0"/>
+                  <a:buChar char="•"/>
+                  <a:defRPr sz="1800" kern="1200">
+                    <a:solidFill>
+                      <a:schemeClr val="tx1"/>
+                    </a:solidFill>
+                    <a:latin typeface="+mn-lt"/>
+                    <a:ea typeface="+mn-ea"/>
+                    <a:cs typeface="+mn-cs"/>
+                  </a:defRPr>
+                </a:lvl8pPr>
+                <a:lvl9pPr marL="3886200" indent="-228600" algn="l" defTabSz="914400" rtl="0" eaLnBrk="1" latinLnBrk="0" hangingPunct="1">
+                  <a:lnSpc>
+                    <a:spcPct val="90000"/>
+                  </a:lnSpc>
+                  <a:spcBef>
+                    <a:spcPts val="500"/>
+                  </a:spcBef>
+                  <a:buFont typeface="Arial" panose="020B0604020202020204" pitchFamily="34" charset="0"/>
+                  <a:buChar char="•"/>
+                  <a:defRPr sz="1800" kern="1200">
+                    <a:solidFill>
+                      <a:schemeClr val="tx1"/>
+                    </a:solidFill>
+                    <a:latin typeface="+mn-lt"/>
+                    <a:ea typeface="+mn-ea"/>
+                    <a:cs typeface="+mn-cs"/>
+                  </a:defRPr>
+                </a:lvl9pPr>
+              </a:lstStyle>
+              <a:p>
+                <a:pPr>
+                  <a:spcBef>
+                    <a:spcPts val="0"/>
+                  </a:spcBef>
+                  <a:spcAft>
+                    <a:spcPts val="0"/>
+                  </a:spcAft>
+                </a:pPr>
+                <a:r>
+                  <a:rPr lang="en-US" sz="1400" dirty="0">
+                    <a:solidFill>
+                      <a:schemeClr val="tx1"/>
+                    </a:solidFill>
+                  </a:rPr>
+                  <a:t>Intro meeting</a:t>
+                </a:r>
+              </a:p>
+            </p:txBody>
+          </p:sp>
+          <p:pic>
+            <p:nvPicPr>
+              <p:cNvPr id="14" name="Graphic 13" descr="Online meeting outline">
+                <a:extLst>
+                  <a:ext uri="{FF2B5EF4-FFF2-40B4-BE49-F238E27FC236}">
+                    <a16:creationId xmlns:a16="http://schemas.microsoft.com/office/drawing/2014/main" id="{2539F180-1FEF-319E-1021-36F58943EC2F}"/>
+                  </a:ext>
+                </a:extLst>
+              </p:cNvPr>
+              <p:cNvPicPr>
+                <a:picLocks noChangeAspect="1"/>
+              </p:cNvPicPr>
+              <p:nvPr/>
+            </p:nvPicPr>
+            <p:blipFill>
+              <a:blip r:embed="rId2">
+                <a:extLst>
+                  <a:ext uri="{28A0092B-C50C-407E-A947-70E740481C1C}">
+                    <a14:useLocalDpi xmlns:a14="http://schemas.microsoft.com/office/drawing/2010/main" val="0"/>
+                  </a:ext>
+                  <a:ext uri="{96DAC541-7B7A-43D3-8B79-37D633B846F1}">
+                    <asvg:svgBlip xmlns:asvg="http://schemas.microsoft.com/office/drawing/2016/SVG/main" r:embed="rId3"/>
+                  </a:ext>
+                </a:extLst>
+              </a:blip>
+              <a:stretch>
+                <a:fillRect/>
+              </a:stretch>
+            </p:blipFill>
+            <p:spPr>
+              <a:xfrm>
+                <a:off x="135059" y="2372300"/>
+                <a:ext cx="914400" cy="914400"/>
+              </a:xfrm>
+              <a:prstGeom prst="rect">
+                <a:avLst/>
+              </a:prstGeom>
+            </p:spPr>
+          </p:pic>
+        </p:grpSp>
+        <p:grpSp>
+          <p:nvGrpSpPr>
+            <p:cNvPr id="10" name="Group 9">
+              <a:extLst>
+                <a:ext uri="{FF2B5EF4-FFF2-40B4-BE49-F238E27FC236}">
+                  <a16:creationId xmlns:a16="http://schemas.microsoft.com/office/drawing/2014/main" id="{1F05EA78-5800-5F3F-265B-D58E028D0522}"/>
+                </a:ext>
+              </a:extLst>
+            </p:cNvPr>
+            <p:cNvGrpSpPr/>
+            <p:nvPr/>
+          </p:nvGrpSpPr>
+          <p:grpSpPr>
+            <a:xfrm>
+              <a:off x="2949360" y="2366551"/>
+              <a:ext cx="1039160" cy="1291155"/>
+              <a:chOff x="2949360" y="2366551"/>
+              <a:chExt cx="1039160" cy="1291155"/>
+            </a:xfrm>
+          </p:grpSpPr>
+          <p:sp>
+            <p:nvSpPr>
+              <p:cNvPr id="11" name="Text Placeholder 26">
+                <a:extLst>
+                  <a:ext uri="{FF2B5EF4-FFF2-40B4-BE49-F238E27FC236}">
+                    <a16:creationId xmlns:a16="http://schemas.microsoft.com/office/drawing/2014/main" id="{FD182E45-8DBA-A157-C6AF-CF0699046FAA}"/>
+                  </a:ext>
+                </a:extLst>
+              </p:cNvPr>
+              <p:cNvSpPr txBox="1">
+                <a:spLocks/>
+              </p:cNvSpPr>
+              <p:nvPr/>
+            </p:nvSpPr>
+            <p:spPr>
+              <a:xfrm>
+                <a:off x="2949360" y="3297343"/>
+                <a:ext cx="1039160" cy="360363"/>
+              </a:xfrm>
+              <a:prstGeom prst="rect">
+                <a:avLst/>
+              </a:prstGeom>
+            </p:spPr>
+            <p:txBody>
+              <a:bodyPr vert="horz" lIns="0" tIns="0" rIns="0" bIns="0" rtlCol="0" anchor="ctr">
+                <a:noAutofit/>
+              </a:bodyPr>
+              <a:lstStyle>
+                <a:lvl1pPr marL="0" indent="0" algn="ctr" defTabSz="914400" rtl="0" eaLnBrk="1" latinLnBrk="0" hangingPunct="1">
+                  <a:lnSpc>
+                    <a:spcPct val="100000"/>
+                  </a:lnSpc>
+                  <a:spcBef>
+                    <a:spcPts val="1000"/>
+                  </a:spcBef>
+                  <a:spcAft>
+                    <a:spcPts val="500"/>
+                  </a:spcAft>
+                  <a:buClr>
+                    <a:srgbClr val="EBAF44"/>
+                  </a:buClr>
+                  <a:buFont typeface="Arial" panose="020B0604020202020204" pitchFamily="34" charset="0"/>
+                  <a:buNone/>
+                  <a:defRPr sz="1800" kern="1200">
+                    <a:solidFill>
+                      <a:schemeClr val="tx1">
+                        <a:lumMod val="75000"/>
+                        <a:lumOff val="25000"/>
+                      </a:schemeClr>
+                    </a:solidFill>
+                    <a:latin typeface="Montserrat" panose="00000500000000000000" pitchFamily="50" charset="0"/>
+                    <a:ea typeface="+mn-ea"/>
+                    <a:cs typeface="+mn-cs"/>
+                  </a:defRPr>
+                </a:lvl1pPr>
+                <a:lvl2pPr marL="542925" indent="-276225" algn="l" defTabSz="914400" rtl="0" eaLnBrk="1" latinLnBrk="0" hangingPunct="1">
+                  <a:lnSpc>
+                    <a:spcPct val="100000"/>
+                  </a:lnSpc>
+                  <a:spcBef>
+                    <a:spcPts val="500"/>
+                  </a:spcBef>
+                  <a:spcAft>
+                    <a:spcPts val="500"/>
+                  </a:spcAft>
+                  <a:buClr>
+                    <a:srgbClr val="EBAF44"/>
+                  </a:buClr>
+                  <a:buFont typeface="Arial" panose="020B0604020202020204" pitchFamily="34" charset="0"/>
+                  <a:buChar char="•"/>
+                  <a:defRPr sz="1800" kern="1200">
+                    <a:solidFill>
+                      <a:schemeClr val="tx2"/>
+                    </a:solidFill>
+                    <a:latin typeface="Montserrat" panose="00000500000000000000" pitchFamily="50" charset="0"/>
+                    <a:ea typeface="+mn-ea"/>
+                    <a:cs typeface="+mn-cs"/>
+                  </a:defRPr>
+                </a:lvl2pPr>
+                <a:lvl3pPr marL="809625" indent="-266700" algn="l" defTabSz="914400" rtl="0" eaLnBrk="1" latinLnBrk="0" hangingPunct="1">
+                  <a:lnSpc>
+                    <a:spcPct val="100000"/>
+                  </a:lnSpc>
+                  <a:spcBef>
+                    <a:spcPts val="500"/>
+                  </a:spcBef>
+                  <a:spcAft>
+                    <a:spcPts val="500"/>
+                  </a:spcAft>
+                  <a:buClr>
+                    <a:srgbClr val="EBAF44"/>
+                  </a:buClr>
+                  <a:buFont typeface="Arial" panose="020B0604020202020204" pitchFamily="34" charset="0"/>
+                  <a:buChar char="•"/>
+                  <a:defRPr sz="1800" kern="1200">
+                    <a:solidFill>
+                      <a:schemeClr val="tx2"/>
+                    </a:solidFill>
+                    <a:latin typeface="Montserrat" panose="00000500000000000000" pitchFamily="50" charset="0"/>
+                    <a:ea typeface="+mn-ea"/>
+                    <a:cs typeface="+mn-cs"/>
+                  </a:defRPr>
+                </a:lvl3pPr>
+                <a:lvl4pPr marL="1076325" indent="-266700" algn="l" defTabSz="914400" rtl="0" eaLnBrk="1" latinLnBrk="0" hangingPunct="1">
+                  <a:lnSpc>
+                    <a:spcPct val="100000"/>
+                  </a:lnSpc>
+                  <a:spcBef>
+                    <a:spcPts val="500"/>
+                  </a:spcBef>
+                  <a:spcAft>
+                    <a:spcPts val="500"/>
+                  </a:spcAft>
+                  <a:buClr>
+                    <a:srgbClr val="EBAF44"/>
+                  </a:buClr>
+                  <a:buFont typeface="Arial" panose="020B0604020202020204" pitchFamily="34" charset="0"/>
+                  <a:buChar char="•"/>
+                  <a:defRPr sz="1800" kern="1200">
+                    <a:solidFill>
+                      <a:schemeClr val="tx2"/>
+                    </a:solidFill>
+                    <a:latin typeface="Montserrat" panose="00000500000000000000" pitchFamily="50" charset="0"/>
+                    <a:ea typeface="+mn-ea"/>
+                    <a:cs typeface="+mn-cs"/>
+                  </a:defRPr>
+                </a:lvl4pPr>
+                <a:lvl5pPr marL="1343025" indent="-266700" algn="l" defTabSz="914400" rtl="0" eaLnBrk="1" latinLnBrk="0" hangingPunct="1">
+                  <a:lnSpc>
+                    <a:spcPct val="100000"/>
+                  </a:lnSpc>
+                  <a:spcBef>
+                    <a:spcPts val="500"/>
+                  </a:spcBef>
+                  <a:spcAft>
+                    <a:spcPts val="500"/>
+                  </a:spcAft>
+                  <a:buClr>
+                    <a:srgbClr val="EBAF44"/>
+                  </a:buClr>
+                  <a:buFont typeface="Arial" panose="020B0604020202020204" pitchFamily="34" charset="0"/>
+                  <a:buChar char="•"/>
+                  <a:defRPr sz="1800" kern="1200">
+                    <a:solidFill>
+                      <a:schemeClr val="tx2"/>
+                    </a:solidFill>
+                    <a:latin typeface="Montserrat" panose="00000500000000000000" pitchFamily="50" charset="0"/>
+                    <a:ea typeface="+mn-ea"/>
+                    <a:cs typeface="+mn-cs"/>
+                  </a:defRPr>
+                </a:lvl5pPr>
+                <a:lvl6pPr marL="2514600" indent="-228600" algn="l" defTabSz="914400" rtl="0" eaLnBrk="1" latinLnBrk="0" hangingPunct="1">
+                  <a:lnSpc>
+                    <a:spcPct val="90000"/>
+                  </a:lnSpc>
+                  <a:spcBef>
+                    <a:spcPts val="500"/>
+                  </a:spcBef>
+                  <a:buFont typeface="Arial" panose="020B0604020202020204" pitchFamily="34" charset="0"/>
+                  <a:buChar char="•"/>
+                  <a:defRPr sz="1800" kern="1200">
+                    <a:solidFill>
+                      <a:schemeClr val="tx1"/>
+                    </a:solidFill>
+                    <a:latin typeface="+mn-lt"/>
+                    <a:ea typeface="+mn-ea"/>
+                    <a:cs typeface="+mn-cs"/>
+                  </a:defRPr>
+                </a:lvl6pPr>
+                <a:lvl7pPr marL="2971800" indent="-228600" algn="l" defTabSz="914400" rtl="0" eaLnBrk="1" latinLnBrk="0" hangingPunct="1">
+                  <a:lnSpc>
+                    <a:spcPct val="90000"/>
+                  </a:lnSpc>
+                  <a:spcBef>
+                    <a:spcPts val="500"/>
+                  </a:spcBef>
+                  <a:buFont typeface="Arial" panose="020B0604020202020204" pitchFamily="34" charset="0"/>
+                  <a:buChar char="•"/>
+                  <a:defRPr sz="1800" kern="1200">
+                    <a:solidFill>
+                      <a:schemeClr val="tx1"/>
+                    </a:solidFill>
+                    <a:latin typeface="+mn-lt"/>
+                    <a:ea typeface="+mn-ea"/>
+                    <a:cs typeface="+mn-cs"/>
+                  </a:defRPr>
+                </a:lvl7pPr>
+                <a:lvl8pPr marL="3429000" indent="-228600" algn="l" defTabSz="914400" rtl="0" eaLnBrk="1" latinLnBrk="0" hangingPunct="1">
+                  <a:lnSpc>
+                    <a:spcPct val="90000"/>
+                  </a:lnSpc>
+                  <a:spcBef>
+                    <a:spcPts val="500"/>
+                  </a:spcBef>
+                  <a:buFont typeface="Arial" panose="020B0604020202020204" pitchFamily="34" charset="0"/>
+                  <a:buChar char="•"/>
+                  <a:defRPr sz="1800" kern="1200">
+                    <a:solidFill>
+                      <a:schemeClr val="tx1"/>
+                    </a:solidFill>
+                    <a:latin typeface="+mn-lt"/>
+                    <a:ea typeface="+mn-ea"/>
+                    <a:cs typeface="+mn-cs"/>
+                  </a:defRPr>
+                </a:lvl8pPr>
+                <a:lvl9pPr marL="3886200" indent="-228600" algn="l" defTabSz="914400" rtl="0" eaLnBrk="1" latinLnBrk="0" hangingPunct="1">
+                  <a:lnSpc>
+                    <a:spcPct val="90000"/>
+                  </a:lnSpc>
+                  <a:spcBef>
+                    <a:spcPts val="500"/>
+                  </a:spcBef>
+                  <a:buFont typeface="Arial" panose="020B0604020202020204" pitchFamily="34" charset="0"/>
+                  <a:buChar char="•"/>
+                  <a:defRPr sz="1800" kern="1200">
+                    <a:solidFill>
+                      <a:schemeClr val="tx1"/>
+                    </a:solidFill>
+                    <a:latin typeface="+mn-lt"/>
+                    <a:ea typeface="+mn-ea"/>
+                    <a:cs typeface="+mn-cs"/>
+                  </a:defRPr>
+                </a:lvl9pPr>
+              </a:lstStyle>
+              <a:p>
+                <a:pPr>
+                  <a:spcBef>
+                    <a:spcPts val="0"/>
+                  </a:spcBef>
+                  <a:spcAft>
+                    <a:spcPts val="0"/>
+                  </a:spcAft>
+                </a:pPr>
+                <a:r>
+                  <a:rPr lang="en-US" sz="1400" dirty="0">
+                    <a:solidFill>
+                      <a:schemeClr val="tx1"/>
+                    </a:solidFill>
+                  </a:rPr>
+                  <a:t>Dose report</a:t>
+                </a:r>
+              </a:p>
+            </p:txBody>
+          </p:sp>
+          <p:pic>
+            <p:nvPicPr>
+              <p:cNvPr id="12" name="Graphic 11" descr="Document outline">
+                <a:extLst>
+                  <a:ext uri="{FF2B5EF4-FFF2-40B4-BE49-F238E27FC236}">
+                    <a16:creationId xmlns:a16="http://schemas.microsoft.com/office/drawing/2014/main" id="{D9E9E935-6F70-60CC-DE2A-6AEA4F6D95C1}"/>
+                  </a:ext>
+                </a:extLst>
+              </p:cNvPr>
+              <p:cNvPicPr>
+                <a:picLocks noChangeAspect="1"/>
+              </p:cNvPicPr>
+              <p:nvPr/>
+            </p:nvPicPr>
+            <p:blipFill>
+              <a:blip r:embed="rId6">
+                <a:extLst>
+                  <a:ext uri="{28A0092B-C50C-407E-A947-70E740481C1C}">
+                    <a14:useLocalDpi xmlns:a14="http://schemas.microsoft.com/office/drawing/2010/main" val="0"/>
+                  </a:ext>
+                  <a:ext uri="{96DAC541-7B7A-43D3-8B79-37D633B846F1}">
+                    <asvg:svgBlip xmlns:asvg="http://schemas.microsoft.com/office/drawing/2016/SVG/main" r:embed="rId7"/>
+                  </a:ext>
+                </a:extLst>
+              </a:blip>
+              <a:stretch>
+                <a:fillRect/>
+              </a:stretch>
+            </p:blipFill>
+            <p:spPr>
+              <a:xfrm>
+                <a:off x="3017382" y="2366551"/>
+                <a:ext cx="914400" cy="914400"/>
+              </a:xfrm>
+              <a:prstGeom prst="rect">
+                <a:avLst/>
+              </a:prstGeom>
+            </p:spPr>
+          </p:pic>
+        </p:grpSp>
+      </p:grpSp>
+    </p:spTree>
+    <p:extLst>
+      <p:ext uri="{BB962C8B-B14F-4D97-AF65-F5344CB8AC3E}">
+        <p14:creationId xmlns:p14="http://schemas.microsoft.com/office/powerpoint/2010/main" val="161619836"/>
+      </p:ext>
+    </p:extLst>
+  </p:cSld>
+  <p:clrMapOvr>
+    <a:masterClrMapping/>
+  </p:clrMapOvr>
+</p:sld>
+</file>
+
 <file path=ppt/theme/theme1.xml><?xml version="1.0" encoding="utf-8"?>
 <a:theme xmlns:a="http://schemas.openxmlformats.org/drawingml/2006/main" name="Office Theme">
   <a:themeElements>

</xml_diff>